<commit_message>
update agenda figure in paper
</commit_message>
<xml_diff>
--- a/paper/figures/agenda.pptx
+++ b/paper/figures/agenda.pptx
@@ -273,7 +273,7 @@
           <a:p>
             <a:fld id="{5288CD90-1D7D-409D-9985-8EA1B360B9B3}" type="datetimeFigureOut">
               <a:rPr lang="en-US" smtClean="0"/>
-              <a:t>4/17/2024</a:t>
+              <a:t>12/4/2025</a:t>
             </a:fld>
             <a:endParaRPr lang="en-US"/>
           </a:p>
@@ -473,7 +473,7 @@
           <a:p>
             <a:fld id="{5288CD90-1D7D-409D-9985-8EA1B360B9B3}" type="datetimeFigureOut">
               <a:rPr lang="en-US" smtClean="0"/>
-              <a:t>4/17/2024</a:t>
+              <a:t>12/4/2025</a:t>
             </a:fld>
             <a:endParaRPr lang="en-US"/>
           </a:p>
@@ -683,7 +683,7 @@
           <a:p>
             <a:fld id="{5288CD90-1D7D-409D-9985-8EA1B360B9B3}" type="datetimeFigureOut">
               <a:rPr lang="en-US" smtClean="0"/>
-              <a:t>4/17/2024</a:t>
+              <a:t>12/4/2025</a:t>
             </a:fld>
             <a:endParaRPr lang="en-US"/>
           </a:p>
@@ -883,7 +883,7 @@
           <a:p>
             <a:fld id="{5288CD90-1D7D-409D-9985-8EA1B360B9B3}" type="datetimeFigureOut">
               <a:rPr lang="en-US" smtClean="0"/>
-              <a:t>4/17/2024</a:t>
+              <a:t>12/4/2025</a:t>
             </a:fld>
             <a:endParaRPr lang="en-US"/>
           </a:p>
@@ -1159,7 +1159,7 @@
           <a:p>
             <a:fld id="{5288CD90-1D7D-409D-9985-8EA1B360B9B3}" type="datetimeFigureOut">
               <a:rPr lang="en-US" smtClean="0"/>
-              <a:t>4/17/2024</a:t>
+              <a:t>12/4/2025</a:t>
             </a:fld>
             <a:endParaRPr lang="en-US"/>
           </a:p>
@@ -1427,7 +1427,7 @@
           <a:p>
             <a:fld id="{5288CD90-1D7D-409D-9985-8EA1B360B9B3}" type="datetimeFigureOut">
               <a:rPr lang="en-US" smtClean="0"/>
-              <a:t>4/17/2024</a:t>
+              <a:t>12/4/2025</a:t>
             </a:fld>
             <a:endParaRPr lang="en-US"/>
           </a:p>
@@ -1842,7 +1842,7 @@
           <a:p>
             <a:fld id="{5288CD90-1D7D-409D-9985-8EA1B360B9B3}" type="datetimeFigureOut">
               <a:rPr lang="en-US" smtClean="0"/>
-              <a:t>4/17/2024</a:t>
+              <a:t>12/4/2025</a:t>
             </a:fld>
             <a:endParaRPr lang="en-US"/>
           </a:p>
@@ -1984,7 +1984,7 @@
           <a:p>
             <a:fld id="{5288CD90-1D7D-409D-9985-8EA1B360B9B3}" type="datetimeFigureOut">
               <a:rPr lang="en-US" smtClean="0"/>
-              <a:t>4/17/2024</a:t>
+              <a:t>12/4/2025</a:t>
             </a:fld>
             <a:endParaRPr lang="en-US"/>
           </a:p>
@@ -2097,7 +2097,7 @@
           <a:p>
             <a:fld id="{5288CD90-1D7D-409D-9985-8EA1B360B9B3}" type="datetimeFigureOut">
               <a:rPr lang="en-US" smtClean="0"/>
-              <a:t>4/17/2024</a:t>
+              <a:t>12/4/2025</a:t>
             </a:fld>
             <a:endParaRPr lang="en-US"/>
           </a:p>
@@ -2410,7 +2410,7 @@
           <a:p>
             <a:fld id="{5288CD90-1D7D-409D-9985-8EA1B360B9B3}" type="datetimeFigureOut">
               <a:rPr lang="en-US" smtClean="0"/>
-              <a:t>4/17/2024</a:t>
+              <a:t>12/4/2025</a:t>
             </a:fld>
             <a:endParaRPr lang="en-US"/>
           </a:p>
@@ -2699,7 +2699,7 @@
           <a:p>
             <a:fld id="{5288CD90-1D7D-409D-9985-8EA1B360B9B3}" type="datetimeFigureOut">
               <a:rPr lang="en-US" smtClean="0"/>
-              <a:t>4/17/2024</a:t>
+              <a:t>12/4/2025</a:t>
             </a:fld>
             <a:endParaRPr lang="en-US"/>
           </a:p>
@@ -2942,7 +2942,7 @@
           <a:p>
             <a:fld id="{5288CD90-1D7D-409D-9985-8EA1B360B9B3}" type="datetimeFigureOut">
               <a:rPr lang="en-US" smtClean="0"/>
-              <a:t>4/17/2024</a:t>
+              <a:t>12/4/2025</a:t>
             </a:fld>
             <a:endParaRPr lang="en-US"/>
           </a:p>
@@ -3759,7 +3759,7 @@
                 <a:latin typeface="Arial" panose="020B0604020202020204" pitchFamily="34" charset="0"/>
                 <a:cs typeface="Arial" panose="020B0604020202020204" pitchFamily="34" charset="0"/>
               </a:rPr>
-              <a:t>Introduction to Python (I)</a:t>
+              <a:t>Introduction to Python (I, II)</a:t>
             </a:r>
           </a:p>
         </p:txBody>
@@ -4631,14 +4631,14 @@
                 <a:latin typeface="Arial" panose="020B0604020202020204" pitchFamily="34" charset="0"/>
                 <a:cs typeface="Arial" panose="020B0604020202020204" pitchFamily="34" charset="0"/>
               </a:rPr>
-              <a:t>Week 3 </a:t>
+              <a:t>Week 4 </a:t>
             </a:r>
             <a:r>
               <a:rPr lang="en-US" sz="1200" dirty="0">
                 <a:latin typeface="Arial" panose="020B0604020202020204" pitchFamily="34" charset="0"/>
                 <a:cs typeface="Arial" panose="020B0604020202020204" pitchFamily="34" charset="0"/>
               </a:rPr>
-              <a:t>Introduction to Python (II)</a:t>
+              <a:t>Introduction to Python (III)</a:t>
             </a:r>
           </a:p>
         </p:txBody>

</xml_diff>